<commit_message>
Added research paper - 1 in ppt
</commit_message>
<xml_diff>
--- a/Phase1.pptx
+++ b/Phase1.pptx
@@ -7,6 +7,7 @@
   <p:sldIdLst>
     <p:sldId id="256" r:id="rId2"/>
     <p:sldId id="257" r:id="rId3"/>
+    <p:sldId id="258" r:id="rId4"/>
   </p:sldIdLst>
   <p:sldSz cx="12192000" cy="6858000"/>
   <p:notesSz cx="6858000" cy="9144000"/>
@@ -105,6 +106,11 @@
       </a:defRPr>
     </a:lvl9pPr>
   </p:defaultTextStyle>
+  <p:extLst>
+    <p:ext uri="{EFAFB233-063F-42B5-8137-9DF3F51BA10A}">
+      <p15:sldGuideLst xmlns:p15="http://schemas.microsoft.com/office/powerpoint/2012/main"/>
+    </p:ext>
+  </p:extLst>
 </p:presentation>
 </file>
 
@@ -255,7 +261,7 @@
           <a:p>
             <a:fld id="{A2844810-C7DE-4943-ACE8-1A6314E74F3D}" type="datetimeFigureOut">
               <a:rPr lang="en-US" smtClean="0"/>
-              <a:t>2/22/2023</a:t>
+              <a:t>2/23/2023</a:t>
             </a:fld>
             <a:endParaRPr lang="en-US"/>
           </a:p>
@@ -453,7 +459,7 @@
           <a:p>
             <a:fld id="{A2844810-C7DE-4943-ACE8-1A6314E74F3D}" type="datetimeFigureOut">
               <a:rPr lang="en-US" smtClean="0"/>
-              <a:t>2/22/2023</a:t>
+              <a:t>2/23/2023</a:t>
             </a:fld>
             <a:endParaRPr lang="en-US"/>
           </a:p>
@@ -661,7 +667,7 @@
           <a:p>
             <a:fld id="{A2844810-C7DE-4943-ACE8-1A6314E74F3D}" type="datetimeFigureOut">
               <a:rPr lang="en-US" smtClean="0"/>
-              <a:t>2/22/2023</a:t>
+              <a:t>2/23/2023</a:t>
             </a:fld>
             <a:endParaRPr lang="en-US"/>
           </a:p>
@@ -859,7 +865,7 @@
           <a:p>
             <a:fld id="{A2844810-C7DE-4943-ACE8-1A6314E74F3D}" type="datetimeFigureOut">
               <a:rPr lang="en-US" smtClean="0"/>
-              <a:t>2/22/2023</a:t>
+              <a:t>2/23/2023</a:t>
             </a:fld>
             <a:endParaRPr lang="en-US"/>
           </a:p>
@@ -1134,7 +1140,7 @@
           <a:p>
             <a:fld id="{A2844810-C7DE-4943-ACE8-1A6314E74F3D}" type="datetimeFigureOut">
               <a:rPr lang="en-US" smtClean="0"/>
-              <a:t>2/22/2023</a:t>
+              <a:t>2/23/2023</a:t>
             </a:fld>
             <a:endParaRPr lang="en-US"/>
           </a:p>
@@ -1399,7 +1405,7 @@
           <a:p>
             <a:fld id="{A2844810-C7DE-4943-ACE8-1A6314E74F3D}" type="datetimeFigureOut">
               <a:rPr lang="en-US" smtClean="0"/>
-              <a:t>2/22/2023</a:t>
+              <a:t>2/23/2023</a:t>
             </a:fld>
             <a:endParaRPr lang="en-US"/>
           </a:p>
@@ -1811,7 +1817,7 @@
           <a:p>
             <a:fld id="{A2844810-C7DE-4943-ACE8-1A6314E74F3D}" type="datetimeFigureOut">
               <a:rPr lang="en-US" smtClean="0"/>
-              <a:t>2/22/2023</a:t>
+              <a:t>2/23/2023</a:t>
             </a:fld>
             <a:endParaRPr lang="en-US"/>
           </a:p>
@@ -1952,7 +1958,7 @@
           <a:p>
             <a:fld id="{A2844810-C7DE-4943-ACE8-1A6314E74F3D}" type="datetimeFigureOut">
               <a:rPr lang="en-US" smtClean="0"/>
-              <a:t>2/22/2023</a:t>
+              <a:t>2/23/2023</a:t>
             </a:fld>
             <a:endParaRPr lang="en-US"/>
           </a:p>
@@ -2065,7 +2071,7 @@
           <a:p>
             <a:fld id="{A2844810-C7DE-4943-ACE8-1A6314E74F3D}" type="datetimeFigureOut">
               <a:rPr lang="en-US" smtClean="0"/>
-              <a:t>2/22/2023</a:t>
+              <a:t>2/23/2023</a:t>
             </a:fld>
             <a:endParaRPr lang="en-US"/>
           </a:p>
@@ -2376,7 +2382,7 @@
           <a:p>
             <a:fld id="{A2844810-C7DE-4943-ACE8-1A6314E74F3D}" type="datetimeFigureOut">
               <a:rPr lang="en-US" smtClean="0"/>
-              <a:t>2/22/2023</a:t>
+              <a:t>2/23/2023</a:t>
             </a:fld>
             <a:endParaRPr lang="en-US"/>
           </a:p>
@@ -2664,7 +2670,7 @@
           <a:p>
             <a:fld id="{A2844810-C7DE-4943-ACE8-1A6314E74F3D}" type="datetimeFigureOut">
               <a:rPr lang="en-US" smtClean="0"/>
-              <a:t>2/22/2023</a:t>
+              <a:t>2/23/2023</a:t>
             </a:fld>
             <a:endParaRPr lang="en-US"/>
           </a:p>
@@ -2905,7 +2911,7 @@
           <a:p>
             <a:fld id="{A2844810-C7DE-4943-ACE8-1A6314E74F3D}" type="datetimeFigureOut">
               <a:rPr lang="en-US" smtClean="0"/>
-              <a:t>2/22/2023</a:t>
+              <a:t>2/23/2023</a:t>
             </a:fld>
             <a:endParaRPr lang="en-US"/>
           </a:p>
@@ -3420,10 +3426,27 @@
         </p:nvSpPr>
         <p:spPr/>
         <p:txBody>
-          <a:bodyPr/>
-          <a:lstStyle/>
-          <a:p>
-            <a:endParaRPr lang="en-US"/>
+          <a:bodyPr>
+            <a:normAutofit fontScale="90000"/>
+          </a:bodyPr>
+          <a:lstStyle/>
+          <a:p>
+            <a:r>
+              <a:rPr lang="en-US" sz="6000" b="1" dirty="0"/>
+              <a:t>Research Paper – I</a:t>
+            </a:r>
+            <a:br>
+              <a:rPr lang="en-US" dirty="0"/>
+            </a:br>
+            <a:r>
+              <a:rPr lang="en-US" sz="3100" i="1" dirty="0" err="1"/>
+              <a:t>Youtube</a:t>
+            </a:r>
+            <a:r>
+              <a:rPr lang="en-US" sz="3100" i="1" dirty="0"/>
+              <a:t> Trending Video analysis by Dublin School</a:t>
+            </a:r>
+            <a:endParaRPr lang="en-US" i="1" dirty="0"/>
           </a:p>
         </p:txBody>
       </p:sp>
@@ -3448,7 +3471,69 @@
           <a:bodyPr/>
           <a:lstStyle/>
           <a:p>
-            <a:endParaRPr lang="en-US"/>
+            <a:pPr marL="0" indent="0">
+              <a:buNone/>
+            </a:pPr>
+            <a:r>
+              <a:rPr lang="en-US" dirty="0"/>
+              <a:t>What did they do?</a:t>
+            </a:r>
+          </a:p>
+          <a:p>
+            <a:pPr>
+              <a:buFontTx/>
+              <a:buChar char="-"/>
+            </a:pPr>
+            <a:r>
+              <a:rPr lang="en-US" dirty="0"/>
+              <a:t>Predicting the number of days video will take to get on trending list</a:t>
+            </a:r>
+          </a:p>
+          <a:p>
+            <a:pPr>
+              <a:buFontTx/>
+              <a:buChar char="-"/>
+            </a:pPr>
+            <a:r>
+              <a:rPr lang="en-US" dirty="0"/>
+              <a:t>Predicting the number of days video will trend on trending list</a:t>
+            </a:r>
+          </a:p>
+          <a:p>
+            <a:pPr>
+              <a:buFontTx/>
+              <a:buChar char="-"/>
+            </a:pPr>
+            <a:endParaRPr lang="en-US" dirty="0"/>
+          </a:p>
+          <a:p>
+            <a:pPr marL="0" indent="0">
+              <a:buNone/>
+            </a:pPr>
+            <a:r>
+              <a:rPr lang="en-US" dirty="0"/>
+              <a:t>What didn’t they do?</a:t>
+            </a:r>
+          </a:p>
+          <a:p>
+            <a:pPr>
+              <a:buFontTx/>
+              <a:buChar char="-"/>
+            </a:pPr>
+            <a:r>
+              <a:rPr lang="en-US" dirty="0"/>
+              <a:t>Making use of Video picture in the model prediction</a:t>
+            </a:r>
+          </a:p>
+          <a:p>
+            <a:pPr>
+              <a:buFontTx/>
+              <a:buChar char="-"/>
+            </a:pPr>
+            <a:r>
+              <a:rPr lang="en-US" dirty="0"/>
+              <a:t>Making use of comments</a:t>
+            </a:r>
           </a:p>
         </p:txBody>
       </p:sp>
@@ -3456,6 +3541,86 @@
     <p:extLst>
       <p:ext uri="{BB962C8B-B14F-4D97-AF65-F5344CB8AC3E}">
         <p14:creationId xmlns:p14="http://schemas.microsoft.com/office/powerpoint/2010/main" val="4140099595"/>
+      </p:ext>
+    </p:extLst>
+  </p:cSld>
+  <p:clrMapOvr>
+    <a:masterClrMapping/>
+  </p:clrMapOvr>
+</p:sld>
+</file>
+
+<file path=ppt/slides/slide3.xml><?xml version="1.0" encoding="utf-8"?>
+<p:sld xmlns:a="http://schemas.openxmlformats.org/drawingml/2006/main" xmlns:r="http://schemas.openxmlformats.org/officeDocument/2006/relationships" xmlns:p="http://schemas.openxmlformats.org/presentationml/2006/main">
+  <p:cSld>
+    <p:spTree>
+      <p:nvGrpSpPr>
+        <p:cNvPr id="1" name=""/>
+        <p:cNvGrpSpPr/>
+        <p:nvPr/>
+      </p:nvGrpSpPr>
+      <p:grpSpPr>
+        <a:xfrm>
+          <a:off x="0" y="0"/>
+          <a:ext cx="0" cy="0"/>
+          <a:chOff x="0" y="0"/>
+          <a:chExt cx="0" cy="0"/>
+        </a:xfrm>
+      </p:grpSpPr>
+      <p:sp>
+        <p:nvSpPr>
+          <p:cNvPr id="2" name="Title 1">
+            <a:extLst>
+              <a:ext uri="{FF2B5EF4-FFF2-40B4-BE49-F238E27FC236}">
+                <a16:creationId xmlns:a16="http://schemas.microsoft.com/office/drawing/2014/main" id="{F9584C52-0E39-D57E-72D8-30C8482C0709}"/>
+              </a:ext>
+            </a:extLst>
+          </p:cNvPr>
+          <p:cNvSpPr>
+            <a:spLocks noGrp="1"/>
+          </p:cNvSpPr>
+          <p:nvPr>
+            <p:ph type="title"/>
+          </p:nvPr>
+        </p:nvSpPr>
+        <p:spPr/>
+        <p:txBody>
+          <a:bodyPr/>
+          <a:lstStyle/>
+          <a:p>
+            <a:endParaRPr lang="en-US" dirty="0"/>
+          </a:p>
+        </p:txBody>
+      </p:sp>
+      <p:sp>
+        <p:nvSpPr>
+          <p:cNvPr id="3" name="Content Placeholder 2">
+            <a:extLst>
+              <a:ext uri="{FF2B5EF4-FFF2-40B4-BE49-F238E27FC236}">
+                <a16:creationId xmlns:a16="http://schemas.microsoft.com/office/drawing/2014/main" id="{6E75CA7C-3067-536D-3D0D-0E688EFC3334}"/>
+              </a:ext>
+            </a:extLst>
+          </p:cNvPr>
+          <p:cNvSpPr>
+            <a:spLocks noGrp="1"/>
+          </p:cNvSpPr>
+          <p:nvPr>
+            <p:ph idx="1"/>
+          </p:nvPr>
+        </p:nvSpPr>
+        <p:spPr/>
+        <p:txBody>
+          <a:bodyPr/>
+          <a:lstStyle/>
+          <a:p>
+            <a:endParaRPr lang="en-US"/>
+          </a:p>
+        </p:txBody>
+      </p:sp>
+    </p:spTree>
+    <p:extLst>
+      <p:ext uri="{BB962C8B-B14F-4D97-AF65-F5344CB8AC3E}">
+        <p14:creationId xmlns:p14="http://schemas.microsoft.com/office/powerpoint/2010/main" val="3907566515"/>
       </p:ext>
     </p:extLst>
   </p:cSld>

</xml_diff>

<commit_message>
random changes in ppt
</commit_message>
<xml_diff>
--- a/Phase1.pptx
+++ b/Phase1.pptx
@@ -13,6 +13,7 @@
     <p:sldId id="266" r:id="rId7"/>
     <p:sldId id="267" r:id="rId8"/>
     <p:sldId id="268" r:id="rId9"/>
+    <p:sldId id="275" r:id="rId10"/>
   </p:sldIdLst>
   <p:sldSz cx="12192000" cy="6858000"/>
   <p:notesSz cx="6858000" cy="9144000"/>
@@ -298,7 +299,7 @@
           <a:p>
             <a:fld id="{7463C41C-A487-0C45-A261-16903102544D}" type="datetimeFigureOut">
               <a:rPr lang="en-US" smtClean="0"/>
-              <a:t>2/27/23</a:t>
+              <a:t>2/27/2023</a:t>
             </a:fld>
             <a:endParaRPr lang="en-US"/>
           </a:p>
@@ -446,7 +447,7 @@
           <a:p>
             <a:fld id="{7463C41C-A487-0C45-A261-16903102544D}" type="datetimeFigureOut">
               <a:rPr lang="en-US" smtClean="0"/>
-              <a:t>2/27/23</a:t>
+              <a:t>2/27/2023</a:t>
             </a:fld>
             <a:endParaRPr lang="en-US"/>
           </a:p>
@@ -671,7 +672,7 @@
           <a:p>
             <a:fld id="{7463C41C-A487-0C45-A261-16903102544D}" type="datetimeFigureOut">
               <a:rPr lang="en-US" smtClean="0"/>
-              <a:t>2/27/23</a:t>
+              <a:t>2/27/2023</a:t>
             </a:fld>
             <a:endParaRPr lang="en-US"/>
           </a:p>
@@ -936,7 +937,7 @@
           <a:p>
             <a:fld id="{7463C41C-A487-0C45-A261-16903102544D}" type="datetimeFigureOut">
               <a:rPr lang="en-US" smtClean="0"/>
-              <a:t>2/27/23</a:t>
+              <a:t>2/27/2023</a:t>
             </a:fld>
             <a:endParaRPr lang="en-US"/>
           </a:p>
@@ -1335,7 +1336,7 @@
           <a:p>
             <a:fld id="{7463C41C-A487-0C45-A261-16903102544D}" type="datetimeFigureOut">
               <a:rPr lang="en-US" smtClean="0"/>
-              <a:t>2/27/23</a:t>
+              <a:t>2/27/2023</a:t>
             </a:fld>
             <a:endParaRPr lang="en-US"/>
           </a:p>
@@ -1432,7 +1433,7 @@
           <a:p>
             <a:fld id="{7463C41C-A487-0C45-A261-16903102544D}" type="datetimeFigureOut">
               <a:rPr lang="en-US" smtClean="0"/>
-              <a:t>2/27/23</a:t>
+              <a:t>2/27/2023</a:t>
             </a:fld>
             <a:endParaRPr lang="en-US"/>
           </a:p>
@@ -1507,7 +1508,7 @@
           <a:p>
             <a:fld id="{7463C41C-A487-0C45-A261-16903102544D}" type="datetimeFigureOut">
               <a:rPr lang="en-US" smtClean="0"/>
-              <a:t>2/27/23</a:t>
+              <a:t>2/27/2023</a:t>
             </a:fld>
             <a:endParaRPr lang="en-US"/>
           </a:p>
@@ -1762,7 +1763,7 @@
           <a:p>
             <a:fld id="{7463C41C-A487-0C45-A261-16903102544D}" type="datetimeFigureOut">
               <a:rPr lang="en-US" smtClean="0"/>
-              <a:t>2/27/23</a:t>
+              <a:t>2/27/2023</a:t>
             </a:fld>
             <a:endParaRPr lang="en-US"/>
           </a:p>
@@ -2144,7 +2145,7 @@
           <a:p>
             <a:fld id="{7463C41C-A487-0C45-A261-16903102544D}" type="datetimeFigureOut">
               <a:rPr lang="en-US" smtClean="0"/>
-              <a:t>2/27/23</a:t>
+              <a:t>2/27/2023</a:t>
             </a:fld>
             <a:endParaRPr lang="en-US"/>
           </a:p>
@@ -5367,6 +5368,95 @@
 </p:sld>
 </file>
 
+<file path=ppt/slides/slide9.xml><?xml version="1.0" encoding="utf-8"?>
+<p:sld xmlns:a="http://schemas.openxmlformats.org/drawingml/2006/main" xmlns:r="http://schemas.openxmlformats.org/officeDocument/2006/relationships" xmlns:p="http://schemas.openxmlformats.org/presentationml/2006/main">
+  <p:cSld>
+    <p:spTree>
+      <p:nvGrpSpPr>
+        <p:cNvPr id="1" name=""/>
+        <p:cNvGrpSpPr/>
+        <p:nvPr/>
+      </p:nvGrpSpPr>
+      <p:grpSpPr>
+        <a:xfrm>
+          <a:off x="0" y="0"/>
+          <a:ext cx="0" cy="0"/>
+          <a:chOff x="0" y="0"/>
+          <a:chExt cx="0" cy="0"/>
+        </a:xfrm>
+      </p:grpSpPr>
+      <p:sp>
+        <p:nvSpPr>
+          <p:cNvPr id="2" name="Title 1">
+            <a:extLst>
+              <a:ext uri="{FF2B5EF4-FFF2-40B4-BE49-F238E27FC236}">
+                <a16:creationId xmlns:a16="http://schemas.microsoft.com/office/drawing/2014/main" id="{26DBAFCE-2C4E-7AD7-A19A-1ABAAF463B8F}"/>
+              </a:ext>
+            </a:extLst>
+          </p:cNvPr>
+          <p:cNvSpPr>
+            <a:spLocks noGrp="1"/>
+          </p:cNvSpPr>
+          <p:nvPr>
+            <p:ph type="ctrTitle"/>
+          </p:nvPr>
+        </p:nvSpPr>
+        <p:spPr/>
+        <p:txBody>
+          <a:bodyPr>
+            <a:normAutofit fontScale="90000"/>
+          </a:bodyPr>
+          <a:lstStyle/>
+          <a:p>
+            <a:r>
+              <a:rPr lang="en-US" dirty="0" err="1"/>
+              <a:t>Balasdklfjasdfjkas</a:t>
+            </a:r>
+            <a:br>
+              <a:rPr lang="en-US"/>
+            </a:br>
+            <a:endParaRPr lang="en-US"/>
+          </a:p>
+        </p:txBody>
+      </p:sp>
+      <p:sp>
+        <p:nvSpPr>
+          <p:cNvPr id="3" name="Subtitle 2">
+            <a:extLst>
+              <a:ext uri="{FF2B5EF4-FFF2-40B4-BE49-F238E27FC236}">
+                <a16:creationId xmlns:a16="http://schemas.microsoft.com/office/drawing/2014/main" id="{582751DD-5A55-199A-4CBD-FAFF983A473A}"/>
+              </a:ext>
+            </a:extLst>
+          </p:cNvPr>
+          <p:cNvSpPr>
+            <a:spLocks noGrp="1"/>
+          </p:cNvSpPr>
+          <p:nvPr>
+            <p:ph type="subTitle" idx="1"/>
+          </p:nvPr>
+        </p:nvSpPr>
+        <p:spPr/>
+        <p:txBody>
+          <a:bodyPr/>
+          <a:lstStyle/>
+          <a:p>
+            <a:endParaRPr lang="en-US"/>
+          </a:p>
+        </p:txBody>
+      </p:sp>
+    </p:spTree>
+    <p:extLst>
+      <p:ext uri="{BB962C8B-B14F-4D97-AF65-F5344CB8AC3E}">
+        <p14:creationId xmlns:p14="http://schemas.microsoft.com/office/powerpoint/2010/main" val="1889972795"/>
+      </p:ext>
+    </p:extLst>
+  </p:cSld>
+  <p:clrMapOvr>
+    <a:masterClrMapping/>
+  </p:clrMapOvr>
+</p:sld>
+</file>
+
 <file path=ppt/theme/theme1.xml><?xml version="1.0" encoding="utf-8"?>
 <a:theme xmlns:a="http://schemas.openxmlformats.org/drawingml/2006/main" name="UMBC Template">
   <a:themeElements>

</xml_diff>